<commit_message>
x ticks labels changed to dates
</commit_message>
<xml_diff>
--- a/results/2099 - wyniki/2099 - raport finansowy.pptx
+++ b/results/2099 - wyniki/2099 - raport finansowy.pptx
@@ -23,6 +23,7 @@
     <p:sldId id="271" r:id="rId22"/>
     <p:sldId id="272" r:id="rId23"/>
     <p:sldId id="273" r:id="rId24"/>
+    <p:sldId id="274" r:id="rId25"/>
   </p:sldIdLst>
   <p:sldSz cx="9144000" cy="6858000" type="screen4x3"/>
   <p:notesSz cx="6858000" cy="9144000"/>
@@ -3514,6 +3515,48 @@
       <p:pic>
         <p:nvPicPr>
           <p:cNvPr id="2" name="Picture 1" descr="plot14.png"/>
+          <p:cNvPicPr>
+            <a:picLocks noChangeAspect="1"/>
+          </p:cNvPicPr>
+          <p:nvPr/>
+        </p:nvPicPr>
+        <p:blipFill>
+          <a:blip r:embed="rId2"/>
+          <a:stretch>
+            <a:fillRect/>
+          </a:stretch>
+        </p:blipFill>
+        <p:spPr>
+          <a:xfrm>
+            <a:off x="0" y="91440"/>
+            <a:ext cx="9601200" cy="6400800"/>
+          </a:xfrm>
+          <a:prstGeom prst="rect">
+            <a:avLst/>
+          </a:prstGeom>
+        </p:spPr>
+      </p:pic>
+    </p:spTree>
+  </p:cSld>
+  <p:clrMapOvr>
+    <a:masterClrMapping/>
+  </p:clrMapOvr>
+</p:sld>
+</file>
+
+<file path=ppt/slides/slide19.xml><?xml version="1.0" encoding="utf-8"?>
+<p:sld xmlns:a="http://schemas.openxmlformats.org/drawingml/2006/main" xmlns:p="http://schemas.openxmlformats.org/presentationml/2006/main" xmlns:r="http://schemas.openxmlformats.org/officeDocument/2006/relationships">
+  <p:cSld>
+    <p:spTree>
+      <p:nvGrpSpPr>
+        <p:cNvPr id="1" name=""/>
+        <p:cNvGrpSpPr/>
+        <p:nvPr/>
+      </p:nvGrpSpPr>
+      <p:grpSpPr/>
+      <p:pic>
+        <p:nvPicPr>
+          <p:cNvPr id="2" name="Picture 1" descr="plot15.png"/>
           <p:cNvPicPr>
             <a:picLocks noChangeAspect="1"/>
           </p:cNvPicPr>

</xml_diff>

<commit_message>
results updated after the changes in part, year and total scneario
</commit_message>
<xml_diff>
--- a/results/2099 - wyniki/2099 - raport finansowy.pptx
+++ b/results/2099 - wyniki/2099 - raport finansowy.pptx
@@ -24,6 +24,8 @@
     <p:sldId id="272" r:id="rId23"/>
     <p:sldId id="273" r:id="rId24"/>
     <p:sldId id="274" r:id="rId25"/>
+    <p:sldId id="275" r:id="rId26"/>
+    <p:sldId id="276" r:id="rId27"/>
   </p:sldIdLst>
   <p:sldSz cx="9144000" cy="6858000" type="screen4x3"/>
   <p:notesSz cx="6858000" cy="9144000"/>
@@ -3634,6 +3636,90 @@
           </a:p>
         </p:txBody>
       </p:sp>
+    </p:spTree>
+  </p:cSld>
+  <p:clrMapOvr>
+    <a:masterClrMapping/>
+  </p:clrMapOvr>
+</p:sld>
+</file>
+
+<file path=ppt/slides/slide20.xml><?xml version="1.0" encoding="utf-8"?>
+<p:sld xmlns:a="http://schemas.openxmlformats.org/drawingml/2006/main" xmlns:p="http://schemas.openxmlformats.org/presentationml/2006/main" xmlns:r="http://schemas.openxmlformats.org/officeDocument/2006/relationships">
+  <p:cSld>
+    <p:spTree>
+      <p:nvGrpSpPr>
+        <p:cNvPr id="1" name=""/>
+        <p:cNvGrpSpPr/>
+        <p:nvPr/>
+      </p:nvGrpSpPr>
+      <p:grpSpPr/>
+      <p:pic>
+        <p:nvPicPr>
+          <p:cNvPr id="2" name="Picture 1" descr="plot16.png"/>
+          <p:cNvPicPr>
+            <a:picLocks noChangeAspect="1"/>
+          </p:cNvPicPr>
+          <p:nvPr/>
+        </p:nvPicPr>
+        <p:blipFill>
+          <a:blip r:embed="rId2"/>
+          <a:stretch>
+            <a:fillRect/>
+          </a:stretch>
+        </p:blipFill>
+        <p:spPr>
+          <a:xfrm>
+            <a:off x="0" y="91440"/>
+            <a:ext cx="9601200" cy="6400800"/>
+          </a:xfrm>
+          <a:prstGeom prst="rect">
+            <a:avLst/>
+          </a:prstGeom>
+        </p:spPr>
+      </p:pic>
+    </p:spTree>
+  </p:cSld>
+  <p:clrMapOvr>
+    <a:masterClrMapping/>
+  </p:clrMapOvr>
+</p:sld>
+</file>
+
+<file path=ppt/slides/slide21.xml><?xml version="1.0" encoding="utf-8"?>
+<p:sld xmlns:a="http://schemas.openxmlformats.org/drawingml/2006/main" xmlns:p="http://schemas.openxmlformats.org/presentationml/2006/main" xmlns:r="http://schemas.openxmlformats.org/officeDocument/2006/relationships">
+  <p:cSld>
+    <p:spTree>
+      <p:nvGrpSpPr>
+        <p:cNvPr id="1" name=""/>
+        <p:cNvGrpSpPr/>
+        <p:nvPr/>
+      </p:nvGrpSpPr>
+      <p:grpSpPr/>
+      <p:pic>
+        <p:nvPicPr>
+          <p:cNvPr id="2" name="Picture 1" descr="plot17.png"/>
+          <p:cNvPicPr>
+            <a:picLocks noChangeAspect="1"/>
+          </p:cNvPicPr>
+          <p:nvPr/>
+        </p:nvPicPr>
+        <p:blipFill>
+          <a:blip r:embed="rId2"/>
+          <a:stretch>
+            <a:fillRect/>
+          </a:stretch>
+        </p:blipFill>
+        <p:spPr>
+          <a:xfrm>
+            <a:off x="0" y="91440"/>
+            <a:ext cx="9601200" cy="6400800"/>
+          </a:xfrm>
+          <a:prstGeom prst="rect">
+            <a:avLst/>
+          </a:prstGeom>
+        </p:spPr>
+      </p:pic>
     </p:spTree>
   </p:cSld>
   <p:clrMapOvr>

</xml_diff>